<commit_message>
Will's edits through L2.5
</commit_message>
<xml_diff>
--- a/Slides/Lesson 0.1 Goals of this Course.pptx
+++ b/Slides/Lesson 0.1 Goals of this Course.pptx
@@ -4857,7 +4857,7 @@
           <a:p>
             <a:fld id="{39B146F0-9122-4808-B0F9-3E08B8294872}" type="datetimeFigureOut">
               <a:rPr lang="en-US" smtClean="0"/>
-              <a:t>7/21/2017</a:t>
+              <a:t>8/11/2017</a:t>
             </a:fld>
             <a:endParaRPr lang="en-US"/>
           </a:p>
@@ -6527,7 +6527,7 @@
                   </a:prstClr>
                 </a:solidFill>
               </a:rPr>
-              <a:t>7/21/2017</a:t>
+              <a:t>8/11/2017</a:t>
             </a:fld>
             <a:endParaRPr lang="en-US">
               <a:solidFill>
@@ -6810,7 +6810,7 @@
                   </a:prstClr>
                 </a:solidFill>
               </a:rPr>
-              <a:t>7/21/2017</a:t>
+              <a:t>8/11/2017</a:t>
             </a:fld>
             <a:endParaRPr lang="en-US">
               <a:solidFill>
@@ -7009,7 +7009,7 @@
                   </a:prstClr>
                 </a:solidFill>
               </a:rPr>
-              <a:t>7/21/2017</a:t>
+              <a:t>8/11/2017</a:t>
             </a:fld>
             <a:endParaRPr lang="en-US">
               <a:solidFill>
@@ -7218,7 +7218,7 @@
                   </a:prstClr>
                 </a:solidFill>
               </a:rPr>
-              <a:t>7/21/2017</a:t>
+              <a:t>8/11/2017</a:t>
             </a:fld>
             <a:endParaRPr lang="en-US">
               <a:solidFill>
@@ -7423,7 +7423,7 @@
                   </a:prstClr>
                 </a:solidFill>
               </a:rPr>
-              <a:t>7/21/2017</a:t>
+              <a:t>8/11/2017</a:t>
             </a:fld>
             <a:endParaRPr lang="en-US" dirty="0">
               <a:solidFill>
@@ -7571,7 +7571,7 @@
                   </a:prstClr>
                 </a:solidFill>
               </a:rPr>
-              <a:t>7/21/2017</a:t>
+              <a:t>8/11/2017</a:t>
             </a:fld>
             <a:endParaRPr lang="en-US">
               <a:solidFill>
@@ -7847,7 +7847,7 @@
                   </a:prstClr>
                 </a:solidFill>
               </a:rPr>
-              <a:t>7/21/2017</a:t>
+              <a:t>8/11/2017</a:t>
             </a:fld>
             <a:endParaRPr lang="en-US">
               <a:solidFill>
@@ -8163,7 +8163,7 @@
                   </a:prstClr>
                 </a:solidFill>
               </a:rPr>
-              <a:t>7/21/2017</a:t>
+              <a:t>8/11/2017</a:t>
             </a:fld>
             <a:endParaRPr lang="en-US">
               <a:solidFill>
@@ -8613,7 +8613,7 @@
                   </a:prstClr>
                 </a:solidFill>
               </a:rPr>
-              <a:t>7/21/2017</a:t>
+              <a:t>8/11/2017</a:t>
             </a:fld>
             <a:endParaRPr lang="en-US">
               <a:solidFill>
@@ -8761,7 +8761,7 @@
                   </a:prstClr>
                 </a:solidFill>
               </a:rPr>
-              <a:t>7/21/2017</a:t>
+              <a:t>8/11/2017</a:t>
             </a:fld>
             <a:endParaRPr lang="en-US">
               <a:solidFill>
@@ -8887,7 +8887,7 @@
                   </a:prstClr>
                 </a:solidFill>
               </a:rPr>
-              <a:t>7/21/2017</a:t>
+              <a:t>8/11/2017</a:t>
             </a:fld>
             <a:endParaRPr lang="en-US">
               <a:solidFill>
@@ -9193,7 +9193,7 @@
                   </a:prstClr>
                 </a:solidFill>
               </a:rPr>
-              <a:t>7/21/2017</a:t>
+              <a:t>8/11/2017</a:t>
             </a:fld>
             <a:endParaRPr lang="en-US">
               <a:solidFill>
@@ -9435,7 +9435,7 @@
                   </a:prstClr>
                 </a:solidFill>
               </a:rPr>
-              <a:t>7/21/2017</a:t>
+              <a:t>8/11/2017</a:t>
             </a:fld>
             <a:endParaRPr lang="en-US">
               <a:solidFill>
@@ -11585,7 +11585,15 @@
             <a:pPr lvl="1"/>
             <a:r>
               <a:rPr lang="en-US" dirty="0"/>
-              <a:t>list the 6 principles for writing beautiful programs</a:t>
+              <a:t>list </a:t>
+            </a:r>
+            <a:r>
+              <a:rPr lang="en-US"/>
+              <a:t>the 7 </a:t>
+            </a:r>
+            <a:r>
+              <a:rPr lang="en-US" dirty="0"/>
+              <a:t>principles for writing beautiful programs</a:t>
             </a:r>
           </a:p>
           <a:p>

</xml_diff>